<commit_message>
update plot of the model
</commit_message>
<xml_diff>
--- a/tien plot model_TH150425.pptx
+++ b/tien plot model_TH150425.pptx
@@ -273,7 +273,7 @@
           <a:p>
             <a:fld id="{EFE2AB68-A8B7-432E-9CB9-84110CF7196D}" type="datetimeFigureOut">
               <a:rPr lang="nb-NO" smtClean="0"/>
-              <a:t>15.09.2025</a:t>
+              <a:t>17.09.2025</a:t>
             </a:fld>
             <a:endParaRPr lang="nb-NO"/>
           </a:p>
@@ -473,7 +473,7 @@
           <a:p>
             <a:fld id="{EFE2AB68-A8B7-432E-9CB9-84110CF7196D}" type="datetimeFigureOut">
               <a:rPr lang="nb-NO" smtClean="0"/>
-              <a:t>15.09.2025</a:t>
+              <a:t>17.09.2025</a:t>
             </a:fld>
             <a:endParaRPr lang="nb-NO"/>
           </a:p>
@@ -683,7 +683,7 @@
           <a:p>
             <a:fld id="{EFE2AB68-A8B7-432E-9CB9-84110CF7196D}" type="datetimeFigureOut">
               <a:rPr lang="nb-NO" smtClean="0"/>
-              <a:t>15.09.2025</a:t>
+              <a:t>17.09.2025</a:t>
             </a:fld>
             <a:endParaRPr lang="nb-NO"/>
           </a:p>
@@ -883,7 +883,7 @@
           <a:p>
             <a:fld id="{EFE2AB68-A8B7-432E-9CB9-84110CF7196D}" type="datetimeFigureOut">
               <a:rPr lang="nb-NO" smtClean="0"/>
-              <a:t>15.09.2025</a:t>
+              <a:t>17.09.2025</a:t>
             </a:fld>
             <a:endParaRPr lang="nb-NO"/>
           </a:p>
@@ -1159,7 +1159,7 @@
           <a:p>
             <a:fld id="{EFE2AB68-A8B7-432E-9CB9-84110CF7196D}" type="datetimeFigureOut">
               <a:rPr lang="nb-NO" smtClean="0"/>
-              <a:t>15.09.2025</a:t>
+              <a:t>17.09.2025</a:t>
             </a:fld>
             <a:endParaRPr lang="nb-NO"/>
           </a:p>
@@ -1427,7 +1427,7 @@
           <a:p>
             <a:fld id="{EFE2AB68-A8B7-432E-9CB9-84110CF7196D}" type="datetimeFigureOut">
               <a:rPr lang="nb-NO" smtClean="0"/>
-              <a:t>15.09.2025</a:t>
+              <a:t>17.09.2025</a:t>
             </a:fld>
             <a:endParaRPr lang="nb-NO"/>
           </a:p>
@@ -1842,7 +1842,7 @@
           <a:p>
             <a:fld id="{EFE2AB68-A8B7-432E-9CB9-84110CF7196D}" type="datetimeFigureOut">
               <a:rPr lang="nb-NO" smtClean="0"/>
-              <a:t>15.09.2025</a:t>
+              <a:t>17.09.2025</a:t>
             </a:fld>
             <a:endParaRPr lang="nb-NO"/>
           </a:p>
@@ -1984,7 +1984,7 @@
           <a:p>
             <a:fld id="{EFE2AB68-A8B7-432E-9CB9-84110CF7196D}" type="datetimeFigureOut">
               <a:rPr lang="nb-NO" smtClean="0"/>
-              <a:t>15.09.2025</a:t>
+              <a:t>17.09.2025</a:t>
             </a:fld>
             <a:endParaRPr lang="nb-NO"/>
           </a:p>
@@ -2097,7 +2097,7 @@
           <a:p>
             <a:fld id="{EFE2AB68-A8B7-432E-9CB9-84110CF7196D}" type="datetimeFigureOut">
               <a:rPr lang="nb-NO" smtClean="0"/>
-              <a:t>15.09.2025</a:t>
+              <a:t>17.09.2025</a:t>
             </a:fld>
             <a:endParaRPr lang="nb-NO"/>
           </a:p>
@@ -2410,7 +2410,7 @@
           <a:p>
             <a:fld id="{EFE2AB68-A8B7-432E-9CB9-84110CF7196D}" type="datetimeFigureOut">
               <a:rPr lang="nb-NO" smtClean="0"/>
-              <a:t>15.09.2025</a:t>
+              <a:t>17.09.2025</a:t>
             </a:fld>
             <a:endParaRPr lang="nb-NO"/>
           </a:p>
@@ -2699,7 +2699,7 @@
           <a:p>
             <a:fld id="{EFE2AB68-A8B7-432E-9CB9-84110CF7196D}" type="datetimeFigureOut">
               <a:rPr lang="nb-NO" smtClean="0"/>
-              <a:t>15.09.2025</a:t>
+              <a:t>17.09.2025</a:t>
             </a:fld>
             <a:endParaRPr lang="nb-NO"/>
           </a:p>
@@ -2942,7 +2942,7 @@
           <a:p>
             <a:fld id="{EFE2AB68-A8B7-432E-9CB9-84110CF7196D}" type="datetimeFigureOut">
               <a:rPr lang="nb-NO" smtClean="0"/>
-              <a:t>15.09.2025</a:t>
+              <a:t>17.09.2025</a:t>
             </a:fld>
             <a:endParaRPr lang="nb-NO"/>
           </a:p>
@@ -3505,10 +3505,10 @@
       </p:sp>
       <p:sp>
         <p:nvSpPr>
-          <p:cNvPr id="9" name="Rectangle 8">
-            <a:extLst>
-              <a:ext uri="{FF2B5EF4-FFF2-40B4-BE49-F238E27FC236}">
-                <a16:creationId xmlns:a16="http://schemas.microsoft.com/office/drawing/2014/main" id="{316BD13C-DC3F-278A-B097-5FB86E44F1F6}"/>
+          <p:cNvPr id="13" name="Rectangle 12">
+            <a:extLst>
+              <a:ext uri="{FF2B5EF4-FFF2-40B4-BE49-F238E27FC236}">
+                <a16:creationId xmlns:a16="http://schemas.microsoft.com/office/drawing/2014/main" id="{D7891158-801D-7FDD-3940-963CEDBEF721}"/>
               </a:ext>
             </a:extLst>
           </p:cNvPr>
@@ -3517,8 +3517,8 @@
         </p:nvSpPr>
         <p:spPr>
           <a:xfrm>
-            <a:off x="7446739" y="2571750"/>
-            <a:ext cx="1885950" cy="628650"/>
+            <a:off x="746695" y="1010330"/>
+            <a:ext cx="685800" cy="1200150"/>
           </a:xfrm>
           <a:prstGeom prst="rect">
             <a:avLst/>
@@ -3544,19 +3544,19 @@
           <a:p>
             <a:pPr algn="ctr"/>
             <a:r>
-              <a:rPr lang="en-US" dirty="0"/>
-              <a:t>Tissue</a:t>
-            </a:r>
-            <a:endParaRPr lang="nb-NO" dirty="0"/>
-          </a:p>
-        </p:txBody>
-      </p:sp>
-      <p:sp>
-        <p:nvSpPr>
-          <p:cNvPr id="10" name="Rectangle 9">
-            <a:extLst>
-              <a:ext uri="{FF2B5EF4-FFF2-40B4-BE49-F238E27FC236}">
-                <a16:creationId xmlns:a16="http://schemas.microsoft.com/office/drawing/2014/main" id="{3711075B-257E-F8AF-F9FB-445C59F33C5F}"/>
+              <a:rPr lang="en-US" sz="1100" b="1" dirty="0"/>
+              <a:t>Arterial Blood</a:t>
+            </a:r>
+            <a:endParaRPr lang="nb-NO" sz="1100" b="1" dirty="0"/>
+          </a:p>
+        </p:txBody>
+      </p:sp>
+      <p:sp>
+        <p:nvSpPr>
+          <p:cNvPr id="14" name="Rectangle 13">
+            <a:extLst>
+              <a:ext uri="{FF2B5EF4-FFF2-40B4-BE49-F238E27FC236}">
+                <a16:creationId xmlns:a16="http://schemas.microsoft.com/office/drawing/2014/main" id="{6DEBEFF8-D76C-AA0A-AD24-C9D3B17542D8}"/>
               </a:ext>
             </a:extLst>
           </p:cNvPr>
@@ -3565,8 +3565,8 @@
         </p:nvSpPr>
         <p:spPr>
           <a:xfrm>
-            <a:off x="7443110" y="3456214"/>
-            <a:ext cx="1885950" cy="628650"/>
+            <a:off x="4921248" y="1010330"/>
+            <a:ext cx="685800" cy="1200149"/>
           </a:xfrm>
           <a:prstGeom prst="rect">
             <a:avLst/>
@@ -3592,19 +3592,19 @@
           <a:p>
             <a:pPr algn="ctr"/>
             <a:r>
-              <a:rPr lang="en-US" dirty="0"/>
-              <a:t>Kidney</a:t>
-            </a:r>
-            <a:endParaRPr lang="nb-NO" dirty="0"/>
-          </a:p>
-        </p:txBody>
-      </p:sp>
-      <p:sp>
-        <p:nvSpPr>
-          <p:cNvPr id="11" name="Rectangle 10">
-            <a:extLst>
-              <a:ext uri="{FF2B5EF4-FFF2-40B4-BE49-F238E27FC236}">
-                <a16:creationId xmlns:a16="http://schemas.microsoft.com/office/drawing/2014/main" id="{2F0A9767-7575-4EB1-5B54-04EFD1F12627}"/>
+              <a:rPr lang="en-US" sz="1100" b="1" dirty="0"/>
+              <a:t>Venous Blood</a:t>
+            </a:r>
+            <a:endParaRPr lang="nb-NO" sz="1100" b="1" dirty="0"/>
+          </a:p>
+        </p:txBody>
+      </p:sp>
+      <p:sp>
+        <p:nvSpPr>
+          <p:cNvPr id="16" name="Rectangle: Rounded Corners 15">
+            <a:extLst>
+              <a:ext uri="{FF2B5EF4-FFF2-40B4-BE49-F238E27FC236}">
+                <a16:creationId xmlns:a16="http://schemas.microsoft.com/office/drawing/2014/main" id="{FB714F9A-419A-6E50-F27A-C522DE2020B8}"/>
               </a:ext>
             </a:extLst>
           </p:cNvPr>
@@ -3613,10 +3613,10 @@
         </p:nvSpPr>
         <p:spPr>
           <a:xfrm>
-            <a:off x="7443110" y="4316187"/>
-            <a:ext cx="1885950" cy="628650"/>
-          </a:xfrm>
-          <a:prstGeom prst="rect">
+            <a:off x="1637620" y="5904777"/>
+            <a:ext cx="857250" cy="628650"/>
+          </a:xfrm>
+          <a:prstGeom prst="roundRect">
             <a:avLst/>
           </a:prstGeom>
         </p:spPr>
@@ -3640,249 +3640,6 @@
           <a:p>
             <a:pPr algn="ctr"/>
             <a:r>
-              <a:rPr lang="en-US" dirty="0"/>
-              <a:t>Liver</a:t>
-            </a:r>
-            <a:endParaRPr lang="nb-NO" dirty="0"/>
-          </a:p>
-        </p:txBody>
-      </p:sp>
-      <p:sp>
-        <p:nvSpPr>
-          <p:cNvPr id="12" name="Rectangle 11">
-            <a:extLst>
-              <a:ext uri="{FF2B5EF4-FFF2-40B4-BE49-F238E27FC236}">
-                <a16:creationId xmlns:a16="http://schemas.microsoft.com/office/drawing/2014/main" id="{AE9EAC3E-0D44-8DBC-3868-2377038E387C}"/>
-              </a:ext>
-            </a:extLst>
-          </p:cNvPr>
-          <p:cNvSpPr/>
-          <p:nvPr/>
-        </p:nvSpPr>
-        <p:spPr>
-          <a:xfrm>
-            <a:off x="9979478" y="1714500"/>
-            <a:ext cx="685800" cy="3143250"/>
-          </a:xfrm>
-          <a:prstGeom prst="rect">
-            <a:avLst/>
-          </a:prstGeom>
-        </p:spPr>
-        <p:style>
-          <a:lnRef idx="2">
-            <a:schemeClr val="accent6"/>
-          </a:lnRef>
-          <a:fillRef idx="1">
-            <a:schemeClr val="lt1"/>
-          </a:fillRef>
-          <a:effectRef idx="0">
-            <a:schemeClr val="accent6"/>
-          </a:effectRef>
-          <a:fontRef idx="minor">
-            <a:schemeClr val="dk1"/>
-          </a:fontRef>
-        </p:style>
-        <p:txBody>
-          <a:bodyPr rtlCol="0" anchor="ctr"/>
-          <a:lstStyle/>
-          <a:p>
-            <a:pPr algn="ctr"/>
-            <a:r>
-              <a:rPr lang="nb-NO" sz="1100" b="1" dirty="0" err="1"/>
-              <a:t>Venous</a:t>
-            </a:r>
-            <a:r>
-              <a:rPr lang="nb-NO" sz="1100" b="1" dirty="0"/>
-              <a:t> Blood</a:t>
-            </a:r>
-          </a:p>
-        </p:txBody>
-      </p:sp>
-      <p:sp>
-        <p:nvSpPr>
-          <p:cNvPr id="13" name="Rectangle 12">
-            <a:extLst>
-              <a:ext uri="{FF2B5EF4-FFF2-40B4-BE49-F238E27FC236}">
-                <a16:creationId xmlns:a16="http://schemas.microsoft.com/office/drawing/2014/main" id="{D7891158-801D-7FDD-3940-963CEDBEF721}"/>
-              </a:ext>
-            </a:extLst>
-          </p:cNvPr>
-          <p:cNvSpPr/>
-          <p:nvPr/>
-        </p:nvSpPr>
-        <p:spPr>
-          <a:xfrm>
-            <a:off x="1078595" y="1714500"/>
-            <a:ext cx="685800" cy="3143250"/>
-          </a:xfrm>
-          <a:prstGeom prst="rect">
-            <a:avLst/>
-          </a:prstGeom>
-        </p:spPr>
-        <p:style>
-          <a:lnRef idx="2">
-            <a:schemeClr val="accent6"/>
-          </a:lnRef>
-          <a:fillRef idx="1">
-            <a:schemeClr val="lt1"/>
-          </a:fillRef>
-          <a:effectRef idx="0">
-            <a:schemeClr val="accent6"/>
-          </a:effectRef>
-          <a:fontRef idx="minor">
-            <a:schemeClr val="dk1"/>
-          </a:fontRef>
-        </p:style>
-        <p:txBody>
-          <a:bodyPr rtlCol="0" anchor="ctr"/>
-          <a:lstStyle/>
-          <a:p>
-            <a:pPr algn="ctr"/>
-            <a:r>
-              <a:rPr lang="en-US" sz="1100" b="1" dirty="0"/>
-              <a:t>Arterial Blood</a:t>
-            </a:r>
-            <a:endParaRPr lang="nb-NO" sz="1100" b="1" dirty="0"/>
-          </a:p>
-        </p:txBody>
-      </p:sp>
-      <p:sp>
-        <p:nvSpPr>
-          <p:cNvPr id="14" name="Rectangle 13">
-            <a:extLst>
-              <a:ext uri="{FF2B5EF4-FFF2-40B4-BE49-F238E27FC236}">
-                <a16:creationId xmlns:a16="http://schemas.microsoft.com/office/drawing/2014/main" id="{6DEBEFF8-D76C-AA0A-AD24-C9D3B17542D8}"/>
-              </a:ext>
-            </a:extLst>
-          </p:cNvPr>
-          <p:cNvSpPr/>
-          <p:nvPr/>
-        </p:nvSpPr>
-        <p:spPr>
-          <a:xfrm>
-            <a:off x="4957535" y="1714500"/>
-            <a:ext cx="685800" cy="3143250"/>
-          </a:xfrm>
-          <a:prstGeom prst="rect">
-            <a:avLst/>
-          </a:prstGeom>
-        </p:spPr>
-        <p:style>
-          <a:lnRef idx="2">
-            <a:schemeClr val="accent6"/>
-          </a:lnRef>
-          <a:fillRef idx="1">
-            <a:schemeClr val="lt1"/>
-          </a:fillRef>
-          <a:effectRef idx="0">
-            <a:schemeClr val="accent6"/>
-          </a:effectRef>
-          <a:fontRef idx="minor">
-            <a:schemeClr val="dk1"/>
-          </a:fontRef>
-        </p:style>
-        <p:txBody>
-          <a:bodyPr rtlCol="0" anchor="ctr"/>
-          <a:lstStyle/>
-          <a:p>
-            <a:pPr algn="ctr"/>
-            <a:r>
-              <a:rPr lang="en-US" sz="1100" b="1" dirty="0"/>
-              <a:t>Venous Blood</a:t>
-            </a:r>
-            <a:endParaRPr lang="nb-NO" sz="1100" b="1" dirty="0"/>
-          </a:p>
-        </p:txBody>
-      </p:sp>
-      <p:sp>
-        <p:nvSpPr>
-          <p:cNvPr id="15" name="Rectangle 14">
-            <a:extLst>
-              <a:ext uri="{FF2B5EF4-FFF2-40B4-BE49-F238E27FC236}">
-                <a16:creationId xmlns:a16="http://schemas.microsoft.com/office/drawing/2014/main" id="{C043DD2C-3CCD-679D-0BDE-7554A6A61624}"/>
-              </a:ext>
-            </a:extLst>
-          </p:cNvPr>
-          <p:cNvSpPr/>
-          <p:nvPr/>
-        </p:nvSpPr>
-        <p:spPr>
-          <a:xfrm>
-            <a:off x="6096000" y="1714500"/>
-            <a:ext cx="685800" cy="3143250"/>
-          </a:xfrm>
-          <a:prstGeom prst="rect">
-            <a:avLst/>
-          </a:prstGeom>
-        </p:spPr>
-        <p:style>
-          <a:lnRef idx="2">
-            <a:schemeClr val="accent6"/>
-          </a:lnRef>
-          <a:fillRef idx="1">
-            <a:schemeClr val="lt1"/>
-          </a:fillRef>
-          <a:effectRef idx="0">
-            <a:schemeClr val="accent6"/>
-          </a:effectRef>
-          <a:fontRef idx="minor">
-            <a:schemeClr val="dk1"/>
-          </a:fontRef>
-        </p:style>
-        <p:txBody>
-          <a:bodyPr rtlCol="0" anchor="ctr"/>
-          <a:lstStyle/>
-          <a:p>
-            <a:pPr algn="ctr"/>
-            <a:r>
-              <a:rPr lang="en-US" sz="1100" b="1" dirty="0"/>
-              <a:t>Arterial Blood</a:t>
-            </a:r>
-            <a:endParaRPr lang="nb-NO" sz="1100" b="1" dirty="0"/>
-          </a:p>
-        </p:txBody>
-      </p:sp>
-      <p:sp>
-        <p:nvSpPr>
-          <p:cNvPr id="16" name="Rectangle: Rounded Corners 15">
-            <a:extLst>
-              <a:ext uri="{FF2B5EF4-FFF2-40B4-BE49-F238E27FC236}">
-                <a16:creationId xmlns:a16="http://schemas.microsoft.com/office/drawing/2014/main" id="{FB714F9A-419A-6E50-F27A-C522DE2020B8}"/>
-              </a:ext>
-            </a:extLst>
-          </p:cNvPr>
-          <p:cNvSpPr/>
-          <p:nvPr/>
-        </p:nvSpPr>
-        <p:spPr>
-          <a:xfrm>
-            <a:off x="1637620" y="5904777"/>
-            <a:ext cx="857250" cy="628650"/>
-          </a:xfrm>
-          <a:prstGeom prst="roundRect">
-            <a:avLst/>
-          </a:prstGeom>
-        </p:spPr>
-        <p:style>
-          <a:lnRef idx="2">
-            <a:schemeClr val="accent6"/>
-          </a:lnRef>
-          <a:fillRef idx="1">
-            <a:schemeClr val="lt1"/>
-          </a:fillRef>
-          <a:effectRef idx="0">
-            <a:schemeClr val="accent6"/>
-          </a:effectRef>
-          <a:fontRef idx="minor">
-            <a:schemeClr val="dk1"/>
-          </a:fontRef>
-        </p:style>
-        <p:txBody>
-          <a:bodyPr rtlCol="0" anchor="ctr"/>
-          <a:lstStyle/>
-          <a:p>
-            <a:pPr algn="ctr"/>
-            <a:r>
               <a:rPr lang="en-US" b="1" dirty="0"/>
               <a:t>dose</a:t>
             </a:r>
@@ -3973,13 +3730,15 @@
               </a:ext>
             </a:extLst>
           </p:cNvPr>
-          <p:cNvCxnSpPr/>
+          <p:cNvCxnSpPr>
+            <a:cxnSpLocks/>
+          </p:cNvCxnSpPr>
           <p:nvPr/>
         </p:nvCxnSpPr>
         <p:spPr>
-          <a:xfrm>
-            <a:off x="1745345" y="2971800"/>
-            <a:ext cx="650421" cy="0"/>
+          <a:xfrm flipV="1">
+            <a:off x="1089594" y="2971800"/>
+            <a:ext cx="1306172" cy="1675721"/>
           </a:xfrm>
           <a:prstGeom prst="straightConnector1">
             <a:avLst/>
@@ -4018,13 +3777,15 @@
               </a:ext>
             </a:extLst>
           </p:cNvPr>
-          <p:cNvCxnSpPr/>
+          <p:cNvCxnSpPr>
+            <a:cxnSpLocks/>
+          </p:cNvCxnSpPr>
           <p:nvPr/>
         </p:nvCxnSpPr>
         <p:spPr>
-          <a:xfrm>
-            <a:off x="1751695" y="3829050"/>
-            <a:ext cx="650421" cy="0"/>
+          <a:xfrm flipV="1">
+            <a:off x="1089594" y="3829050"/>
+            <a:ext cx="1312522" cy="801236"/>
           </a:xfrm>
           <a:prstGeom prst="straightConnector1">
             <a:avLst/>
@@ -4056,20 +3817,22 @@
       </p:cxnSp>
       <p:cxnSp>
         <p:nvCxnSpPr>
-          <p:cNvPr id="23" name="Straight Arrow Connector 22">
-            <a:extLst>
-              <a:ext uri="{FF2B5EF4-FFF2-40B4-BE49-F238E27FC236}">
-                <a16:creationId xmlns:a16="http://schemas.microsoft.com/office/drawing/2014/main" id="{4C881CB3-77CB-6FDF-AA42-6148791500C8}"/>
-              </a:ext>
-            </a:extLst>
-          </p:cNvPr>
-          <p:cNvCxnSpPr/>
+          <p:cNvPr id="24" name="Straight Arrow Connector 23">
+            <a:extLst>
+              <a:ext uri="{FF2B5EF4-FFF2-40B4-BE49-F238E27FC236}">
+                <a16:creationId xmlns:a16="http://schemas.microsoft.com/office/drawing/2014/main" id="{3EBDCDBC-7001-4C08-534D-7D04487665DA}"/>
+              </a:ext>
+            </a:extLst>
+          </p:cNvPr>
+          <p:cNvCxnSpPr>
+            <a:cxnSpLocks/>
+          </p:cNvCxnSpPr>
           <p:nvPr/>
         </p:nvCxnSpPr>
         <p:spPr>
-          <a:xfrm>
-            <a:off x="1745344" y="4669974"/>
-            <a:ext cx="650421" cy="0"/>
+          <a:xfrm flipH="1">
+            <a:off x="1424664" y="2022021"/>
+            <a:ext cx="3472095" cy="0"/>
           </a:xfrm>
           <a:prstGeom prst="straightConnector1">
             <a:avLst/>
@@ -4101,10 +3864,10 @@
       </p:cxnSp>
       <p:cxnSp>
         <p:nvCxnSpPr>
-          <p:cNvPr id="24" name="Straight Arrow Connector 23">
-            <a:extLst>
-              <a:ext uri="{FF2B5EF4-FFF2-40B4-BE49-F238E27FC236}">
-                <a16:creationId xmlns:a16="http://schemas.microsoft.com/office/drawing/2014/main" id="{3EBDCDBC-7001-4C08-534D-7D04487665DA}"/>
+          <p:cNvPr id="44" name="Straight Arrow Connector 43">
+            <a:extLst>
+              <a:ext uri="{FF2B5EF4-FFF2-40B4-BE49-F238E27FC236}">
+                <a16:creationId xmlns:a16="http://schemas.microsoft.com/office/drawing/2014/main" id="{B8EDFEFC-A519-56FA-460F-C492922358FD}"/>
               </a:ext>
             </a:extLst>
           </p:cNvPr>
@@ -4114,9 +3877,9 @@
           <p:nvPr/>
         </p:nvCxnSpPr>
         <p:spPr>
-          <a:xfrm flipH="1">
-            <a:off x="1745344" y="2022021"/>
-            <a:ext cx="3151415" cy="0"/>
+          <a:xfrm>
+            <a:off x="4610100" y="3560355"/>
+            <a:ext cx="0" cy="339634"/>
           </a:xfrm>
           <a:prstGeom prst="straightConnector1">
             <a:avLst/>
@@ -4148,562 +3911,15 @@
       </p:cxnSp>
       <p:cxnSp>
         <p:nvCxnSpPr>
-          <p:cNvPr id="25" name="Straight Arrow Connector 24">
-            <a:extLst>
-              <a:ext uri="{FF2B5EF4-FFF2-40B4-BE49-F238E27FC236}">
-                <a16:creationId xmlns:a16="http://schemas.microsoft.com/office/drawing/2014/main" id="{9A02A2BF-5201-E827-E2F6-BA031D66A6D1}"/>
-              </a:ext>
-            </a:extLst>
-          </p:cNvPr>
-          <p:cNvCxnSpPr/>
-          <p:nvPr/>
-        </p:nvCxnSpPr>
-        <p:spPr>
-          <a:xfrm>
-            <a:off x="4281716" y="2800350"/>
-            <a:ext cx="650421" cy="0"/>
-          </a:xfrm>
-          <a:prstGeom prst="straightConnector1">
-            <a:avLst/>
-          </a:prstGeom>
-          <a:ln w="19050" cap="flat" cmpd="sng" algn="ctr">
-            <a:solidFill>
-              <a:schemeClr val="accent1"/>
-            </a:solidFill>
-            <a:prstDash val="solid"/>
-            <a:round/>
-            <a:headEnd type="none" w="med" len="med"/>
-            <a:tailEnd type="arrow" w="med" len="med"/>
-          </a:ln>
-        </p:spPr>
-        <p:style>
-          <a:lnRef idx="0">
-            <a:scrgbClr r="0" g="0" b="0"/>
-          </a:lnRef>
-          <a:fillRef idx="0">
-            <a:scrgbClr r="0" g="0" b="0"/>
-          </a:fillRef>
-          <a:effectRef idx="0">
-            <a:scrgbClr r="0" g="0" b="0"/>
-          </a:effectRef>
-          <a:fontRef idx="minor">
-            <a:schemeClr val="tx1"/>
-          </a:fontRef>
-        </p:style>
-      </p:cxnSp>
-      <p:cxnSp>
-        <p:nvCxnSpPr>
-          <p:cNvPr id="26" name="Straight Arrow Connector 25">
-            <a:extLst>
-              <a:ext uri="{FF2B5EF4-FFF2-40B4-BE49-F238E27FC236}">
-                <a16:creationId xmlns:a16="http://schemas.microsoft.com/office/drawing/2014/main" id="{0EF79ED4-A5FB-4FF1-49CA-6463D247446B}"/>
-              </a:ext>
-            </a:extLst>
-          </p:cNvPr>
-          <p:cNvCxnSpPr/>
-          <p:nvPr/>
-        </p:nvCxnSpPr>
-        <p:spPr>
-          <a:xfrm>
-            <a:off x="4281715" y="3733800"/>
-            <a:ext cx="650421" cy="0"/>
-          </a:xfrm>
-          <a:prstGeom prst="straightConnector1">
-            <a:avLst/>
-          </a:prstGeom>
-          <a:ln w="19050" cap="flat" cmpd="sng" algn="ctr">
-            <a:solidFill>
-              <a:schemeClr val="accent1"/>
-            </a:solidFill>
-            <a:prstDash val="solid"/>
-            <a:round/>
-            <a:headEnd type="none" w="med" len="med"/>
-            <a:tailEnd type="arrow" w="med" len="med"/>
-          </a:ln>
-        </p:spPr>
-        <p:style>
-          <a:lnRef idx="0">
-            <a:scrgbClr r="0" g="0" b="0"/>
-          </a:lnRef>
-          <a:fillRef idx="0">
-            <a:scrgbClr r="0" g="0" b="0"/>
-          </a:fillRef>
-          <a:effectRef idx="0">
-            <a:scrgbClr r="0" g="0" b="0"/>
-          </a:effectRef>
-          <a:fontRef idx="minor">
-            <a:schemeClr val="tx1"/>
-          </a:fontRef>
-        </p:style>
-      </p:cxnSp>
-      <p:cxnSp>
-        <p:nvCxnSpPr>
-          <p:cNvPr id="27" name="Straight Arrow Connector 26">
-            <a:extLst>
-              <a:ext uri="{FF2B5EF4-FFF2-40B4-BE49-F238E27FC236}">
-                <a16:creationId xmlns:a16="http://schemas.microsoft.com/office/drawing/2014/main" id="{84B6E693-CF38-2954-B297-54C469896319}"/>
-              </a:ext>
-            </a:extLst>
-          </p:cNvPr>
-          <p:cNvCxnSpPr/>
-          <p:nvPr/>
-        </p:nvCxnSpPr>
-        <p:spPr>
-          <a:xfrm>
-            <a:off x="4307115" y="4630512"/>
-            <a:ext cx="650421" cy="0"/>
-          </a:xfrm>
-          <a:prstGeom prst="straightConnector1">
-            <a:avLst/>
-          </a:prstGeom>
-          <a:ln w="19050" cap="flat" cmpd="sng" algn="ctr">
-            <a:solidFill>
-              <a:schemeClr val="accent1"/>
-            </a:solidFill>
-            <a:prstDash val="solid"/>
-            <a:round/>
-            <a:headEnd type="none" w="med" len="med"/>
-            <a:tailEnd type="arrow" w="med" len="med"/>
-          </a:ln>
-        </p:spPr>
-        <p:style>
-          <a:lnRef idx="0">
-            <a:scrgbClr r="0" g="0" b="0"/>
-          </a:lnRef>
-          <a:fillRef idx="0">
-            <a:scrgbClr r="0" g="0" b="0"/>
-          </a:fillRef>
-          <a:effectRef idx="0">
-            <a:scrgbClr r="0" g="0" b="0"/>
-          </a:effectRef>
-          <a:fontRef idx="minor">
-            <a:schemeClr val="tx1"/>
-          </a:fontRef>
-        </p:style>
-      </p:cxnSp>
-      <p:cxnSp>
-        <p:nvCxnSpPr>
-          <p:cNvPr id="29" name="Straight Arrow Connector 28">
-            <a:extLst>
-              <a:ext uri="{FF2B5EF4-FFF2-40B4-BE49-F238E27FC236}">
-                <a16:creationId xmlns:a16="http://schemas.microsoft.com/office/drawing/2014/main" id="{A6EB15EF-3FE3-1975-FD37-45BF38AAF584}"/>
-              </a:ext>
-            </a:extLst>
-          </p:cNvPr>
-          <p:cNvCxnSpPr/>
-          <p:nvPr/>
-        </p:nvCxnSpPr>
-        <p:spPr>
-          <a:xfrm>
-            <a:off x="6792688" y="2886075"/>
-            <a:ext cx="650421" cy="0"/>
-          </a:xfrm>
-          <a:prstGeom prst="straightConnector1">
-            <a:avLst/>
-          </a:prstGeom>
-          <a:ln w="19050" cap="flat" cmpd="sng" algn="ctr">
-            <a:solidFill>
-              <a:schemeClr val="accent1"/>
-            </a:solidFill>
-            <a:prstDash val="solid"/>
-            <a:round/>
-            <a:headEnd type="none" w="med" len="med"/>
-            <a:tailEnd type="arrow" w="med" len="med"/>
-          </a:ln>
-        </p:spPr>
-        <p:style>
-          <a:lnRef idx="0">
-            <a:scrgbClr r="0" g="0" b="0"/>
-          </a:lnRef>
-          <a:fillRef idx="0">
-            <a:scrgbClr r="0" g="0" b="0"/>
-          </a:fillRef>
-          <a:effectRef idx="0">
-            <a:scrgbClr r="0" g="0" b="0"/>
-          </a:effectRef>
-          <a:fontRef idx="minor">
-            <a:schemeClr val="tx1"/>
-          </a:fontRef>
-        </p:style>
-      </p:cxnSp>
-      <p:cxnSp>
-        <p:nvCxnSpPr>
-          <p:cNvPr id="30" name="Straight Arrow Connector 29">
-            <a:extLst>
-              <a:ext uri="{FF2B5EF4-FFF2-40B4-BE49-F238E27FC236}">
-                <a16:creationId xmlns:a16="http://schemas.microsoft.com/office/drawing/2014/main" id="{C1CA1A7A-D459-C662-9A94-BC92AE3916D9}"/>
-              </a:ext>
-            </a:extLst>
-          </p:cNvPr>
-          <p:cNvCxnSpPr/>
-          <p:nvPr/>
-        </p:nvCxnSpPr>
-        <p:spPr>
-          <a:xfrm>
-            <a:off x="6792687" y="3829504"/>
-            <a:ext cx="650421" cy="0"/>
-          </a:xfrm>
-          <a:prstGeom prst="straightConnector1">
-            <a:avLst/>
-          </a:prstGeom>
-          <a:ln w="19050" cap="flat" cmpd="sng" algn="ctr">
-            <a:solidFill>
-              <a:schemeClr val="accent1"/>
-            </a:solidFill>
-            <a:prstDash val="solid"/>
-            <a:round/>
-            <a:headEnd type="none" w="med" len="med"/>
-            <a:tailEnd type="arrow" w="med" len="med"/>
-          </a:ln>
-        </p:spPr>
-        <p:style>
-          <a:lnRef idx="0">
-            <a:scrgbClr r="0" g="0" b="0"/>
-          </a:lnRef>
-          <a:fillRef idx="0">
-            <a:scrgbClr r="0" g="0" b="0"/>
-          </a:fillRef>
-          <a:effectRef idx="0">
-            <a:scrgbClr r="0" g="0" b="0"/>
-          </a:effectRef>
-          <a:fontRef idx="minor">
-            <a:schemeClr val="tx1"/>
-          </a:fontRef>
-        </p:style>
-      </p:cxnSp>
-      <p:cxnSp>
-        <p:nvCxnSpPr>
-          <p:cNvPr id="31" name="Straight Arrow Connector 30">
-            <a:extLst>
-              <a:ext uri="{FF2B5EF4-FFF2-40B4-BE49-F238E27FC236}">
-                <a16:creationId xmlns:a16="http://schemas.microsoft.com/office/drawing/2014/main" id="{764B4A86-74C2-9294-C517-73998B0651B6}"/>
-              </a:ext>
-            </a:extLst>
-          </p:cNvPr>
-          <p:cNvCxnSpPr/>
-          <p:nvPr/>
-        </p:nvCxnSpPr>
-        <p:spPr>
-          <a:xfrm>
-            <a:off x="6792686" y="4669974"/>
-            <a:ext cx="650421" cy="0"/>
-          </a:xfrm>
-          <a:prstGeom prst="straightConnector1">
-            <a:avLst/>
-          </a:prstGeom>
-          <a:ln w="19050" cap="flat" cmpd="sng" algn="ctr">
-            <a:solidFill>
-              <a:schemeClr val="accent1"/>
-            </a:solidFill>
-            <a:prstDash val="solid"/>
-            <a:round/>
-            <a:headEnd type="none" w="med" len="med"/>
-            <a:tailEnd type="arrow" w="med" len="med"/>
-          </a:ln>
-        </p:spPr>
-        <p:style>
-          <a:lnRef idx="0">
-            <a:scrgbClr r="0" g="0" b="0"/>
-          </a:lnRef>
-          <a:fillRef idx="0">
-            <a:scrgbClr r="0" g="0" b="0"/>
-          </a:fillRef>
-          <a:effectRef idx="0">
-            <a:scrgbClr r="0" g="0" b="0"/>
-          </a:effectRef>
-          <a:fontRef idx="minor">
-            <a:schemeClr val="tx1"/>
-          </a:fontRef>
-        </p:style>
-      </p:cxnSp>
-      <p:cxnSp>
-        <p:nvCxnSpPr>
-          <p:cNvPr id="32" name="Straight Arrow Connector 31">
-            <a:extLst>
-              <a:ext uri="{FF2B5EF4-FFF2-40B4-BE49-F238E27FC236}">
-                <a16:creationId xmlns:a16="http://schemas.microsoft.com/office/drawing/2014/main" id="{5725C2D2-63FF-678E-14B3-D05C67304E2D}"/>
+          <p:cNvPr id="48" name="Connector: Elbow 47">
+            <a:extLst>
+              <a:ext uri="{FF2B5EF4-FFF2-40B4-BE49-F238E27FC236}">
+                <a16:creationId xmlns:a16="http://schemas.microsoft.com/office/drawing/2014/main" id="{DB90ED21-4527-E68F-5EC2-7F87F5A4FE1A}"/>
               </a:ext>
             </a:extLst>
           </p:cNvPr>
           <p:cNvCxnSpPr>
             <a:cxnSpLocks/>
-          </p:cNvCxnSpPr>
-          <p:nvPr/>
-        </p:nvCxnSpPr>
-        <p:spPr>
-          <a:xfrm flipH="1">
-            <a:off x="6781800" y="2015217"/>
-            <a:ext cx="3208567" cy="6804"/>
-          </a:xfrm>
-          <a:prstGeom prst="straightConnector1">
-            <a:avLst/>
-          </a:prstGeom>
-          <a:ln w="19050" cap="flat" cmpd="sng" algn="ctr">
-            <a:solidFill>
-              <a:schemeClr val="accent1"/>
-            </a:solidFill>
-            <a:prstDash val="solid"/>
-            <a:round/>
-            <a:headEnd type="none" w="med" len="med"/>
-            <a:tailEnd type="arrow" w="med" len="med"/>
-          </a:ln>
-        </p:spPr>
-        <p:style>
-          <a:lnRef idx="0">
-            <a:scrgbClr r="0" g="0" b="0"/>
-          </a:lnRef>
-          <a:fillRef idx="0">
-            <a:scrgbClr r="0" g="0" b="0"/>
-          </a:fillRef>
-          <a:effectRef idx="0">
-            <a:scrgbClr r="0" g="0" b="0"/>
-          </a:effectRef>
-          <a:fontRef idx="minor">
-            <a:schemeClr val="tx1"/>
-          </a:fontRef>
-        </p:style>
-      </p:cxnSp>
-      <p:cxnSp>
-        <p:nvCxnSpPr>
-          <p:cNvPr id="33" name="Straight Arrow Connector 32">
-            <a:extLst>
-              <a:ext uri="{FF2B5EF4-FFF2-40B4-BE49-F238E27FC236}">
-                <a16:creationId xmlns:a16="http://schemas.microsoft.com/office/drawing/2014/main" id="{4CFBFCC5-A173-1983-4A72-0F4817EC1E91}"/>
-              </a:ext>
-            </a:extLst>
-          </p:cNvPr>
-          <p:cNvCxnSpPr/>
-          <p:nvPr/>
-        </p:nvCxnSpPr>
-        <p:spPr>
-          <a:xfrm>
-            <a:off x="9329059" y="2800350"/>
-            <a:ext cx="650421" cy="0"/>
-          </a:xfrm>
-          <a:prstGeom prst="straightConnector1">
-            <a:avLst/>
-          </a:prstGeom>
-          <a:ln w="19050" cap="flat" cmpd="sng" algn="ctr">
-            <a:solidFill>
-              <a:schemeClr val="accent1"/>
-            </a:solidFill>
-            <a:prstDash val="solid"/>
-            <a:round/>
-            <a:headEnd type="none" w="med" len="med"/>
-            <a:tailEnd type="arrow" w="med" len="med"/>
-          </a:ln>
-        </p:spPr>
-        <p:style>
-          <a:lnRef idx="0">
-            <a:scrgbClr r="0" g="0" b="0"/>
-          </a:lnRef>
-          <a:fillRef idx="0">
-            <a:scrgbClr r="0" g="0" b="0"/>
-          </a:fillRef>
-          <a:effectRef idx="0">
-            <a:scrgbClr r="0" g="0" b="0"/>
-          </a:effectRef>
-          <a:fontRef idx="minor">
-            <a:schemeClr val="tx1"/>
-          </a:fontRef>
-        </p:style>
-      </p:cxnSp>
-      <p:cxnSp>
-        <p:nvCxnSpPr>
-          <p:cNvPr id="34" name="Straight Arrow Connector 33">
-            <a:extLst>
-              <a:ext uri="{FF2B5EF4-FFF2-40B4-BE49-F238E27FC236}">
-                <a16:creationId xmlns:a16="http://schemas.microsoft.com/office/drawing/2014/main" id="{84A452BB-A513-E260-3ED5-AA2179A0036C}"/>
-              </a:ext>
-            </a:extLst>
-          </p:cNvPr>
-          <p:cNvCxnSpPr/>
-          <p:nvPr/>
-        </p:nvCxnSpPr>
-        <p:spPr>
-          <a:xfrm>
-            <a:off x="9329058" y="3733800"/>
-            <a:ext cx="650421" cy="0"/>
-          </a:xfrm>
-          <a:prstGeom prst="straightConnector1">
-            <a:avLst/>
-          </a:prstGeom>
-          <a:ln w="19050" cap="flat" cmpd="sng" algn="ctr">
-            <a:solidFill>
-              <a:schemeClr val="accent1"/>
-            </a:solidFill>
-            <a:prstDash val="solid"/>
-            <a:round/>
-            <a:headEnd type="none" w="med" len="med"/>
-            <a:tailEnd type="arrow" w="med" len="med"/>
-          </a:ln>
-        </p:spPr>
-        <p:style>
-          <a:lnRef idx="0">
-            <a:scrgbClr r="0" g="0" b="0"/>
-          </a:lnRef>
-          <a:fillRef idx="0">
-            <a:scrgbClr r="0" g="0" b="0"/>
-          </a:fillRef>
-          <a:effectRef idx="0">
-            <a:scrgbClr r="0" g="0" b="0"/>
-          </a:effectRef>
-          <a:fontRef idx="minor">
-            <a:schemeClr val="tx1"/>
-          </a:fontRef>
-        </p:style>
-      </p:cxnSp>
-      <p:cxnSp>
-        <p:nvCxnSpPr>
-          <p:cNvPr id="35" name="Straight Arrow Connector 34">
-            <a:extLst>
-              <a:ext uri="{FF2B5EF4-FFF2-40B4-BE49-F238E27FC236}">
-                <a16:creationId xmlns:a16="http://schemas.microsoft.com/office/drawing/2014/main" id="{3162EB67-9500-1C54-F15F-5212369E2A80}"/>
-              </a:ext>
-            </a:extLst>
-          </p:cNvPr>
-          <p:cNvCxnSpPr/>
-          <p:nvPr/>
-        </p:nvCxnSpPr>
-        <p:spPr>
-          <a:xfrm>
-            <a:off x="9329057" y="4630512"/>
-            <a:ext cx="650421" cy="0"/>
-          </a:xfrm>
-          <a:prstGeom prst="straightConnector1">
-            <a:avLst/>
-          </a:prstGeom>
-          <a:ln w="19050" cap="flat" cmpd="sng" algn="ctr">
-            <a:solidFill>
-              <a:schemeClr val="accent1"/>
-            </a:solidFill>
-            <a:prstDash val="solid"/>
-            <a:round/>
-            <a:headEnd type="none" w="med" len="med"/>
-            <a:tailEnd type="arrow" w="med" len="med"/>
-          </a:ln>
-        </p:spPr>
-        <p:style>
-          <a:lnRef idx="0">
-            <a:scrgbClr r="0" g="0" b="0"/>
-          </a:lnRef>
-          <a:fillRef idx="0">
-            <a:scrgbClr r="0" g="0" b="0"/>
-          </a:fillRef>
-          <a:effectRef idx="0">
-            <a:scrgbClr r="0" g="0" b="0"/>
-          </a:effectRef>
-          <a:fontRef idx="minor">
-            <a:schemeClr val="tx1"/>
-          </a:fontRef>
-        </p:style>
-      </p:cxnSp>
-      <p:cxnSp>
-        <p:nvCxnSpPr>
-          <p:cNvPr id="44" name="Straight Arrow Connector 43">
-            <a:extLst>
-              <a:ext uri="{FF2B5EF4-FFF2-40B4-BE49-F238E27FC236}">
-                <a16:creationId xmlns:a16="http://schemas.microsoft.com/office/drawing/2014/main" id="{B8EDFEFC-A519-56FA-460F-C492922358FD}"/>
-              </a:ext>
-            </a:extLst>
-          </p:cNvPr>
-          <p:cNvCxnSpPr>
-            <a:cxnSpLocks/>
-          </p:cNvCxnSpPr>
-          <p:nvPr/>
-        </p:nvCxnSpPr>
-        <p:spPr>
-          <a:xfrm>
-            <a:off x="4557485" y="3745230"/>
-            <a:ext cx="0" cy="339634"/>
-          </a:xfrm>
-          <a:prstGeom prst="straightConnector1">
-            <a:avLst/>
-          </a:prstGeom>
-          <a:ln w="19050" cap="flat" cmpd="sng" algn="ctr">
-            <a:solidFill>
-              <a:schemeClr val="accent1"/>
-            </a:solidFill>
-            <a:prstDash val="solid"/>
-            <a:round/>
-            <a:headEnd type="none" w="med" len="med"/>
-            <a:tailEnd type="arrow" w="med" len="med"/>
-          </a:ln>
-        </p:spPr>
-        <p:style>
-          <a:lnRef idx="0">
-            <a:scrgbClr r="0" g="0" b="0"/>
-          </a:lnRef>
-          <a:fillRef idx="0">
-            <a:scrgbClr r="0" g="0" b="0"/>
-          </a:fillRef>
-          <a:effectRef idx="0">
-            <a:scrgbClr r="0" g="0" b="0"/>
-          </a:effectRef>
-          <a:fontRef idx="minor">
-            <a:schemeClr val="tx1"/>
-          </a:fontRef>
-        </p:style>
-      </p:cxnSp>
-      <p:cxnSp>
-        <p:nvCxnSpPr>
-          <p:cNvPr id="46" name="Straight Arrow Connector 45">
-            <a:extLst>
-              <a:ext uri="{FF2B5EF4-FFF2-40B4-BE49-F238E27FC236}">
-                <a16:creationId xmlns:a16="http://schemas.microsoft.com/office/drawing/2014/main" id="{C480BB6D-4E93-9336-9FAA-2EE8EE10EA04}"/>
-              </a:ext>
-            </a:extLst>
-          </p:cNvPr>
-          <p:cNvCxnSpPr>
-            <a:cxnSpLocks/>
-          </p:cNvCxnSpPr>
-          <p:nvPr/>
-        </p:nvCxnSpPr>
-        <p:spPr>
-          <a:xfrm>
-            <a:off x="9643835" y="3745230"/>
-            <a:ext cx="0" cy="339634"/>
-          </a:xfrm>
-          <a:prstGeom prst="straightConnector1">
-            <a:avLst/>
-          </a:prstGeom>
-          <a:ln w="19050" cap="flat" cmpd="sng" algn="ctr">
-            <a:solidFill>
-              <a:schemeClr val="accent1"/>
-            </a:solidFill>
-            <a:prstDash val="solid"/>
-            <a:round/>
-            <a:headEnd type="none" w="med" len="med"/>
-            <a:tailEnd type="arrow" w="med" len="med"/>
-          </a:ln>
-        </p:spPr>
-        <p:style>
-          <a:lnRef idx="0">
-            <a:scrgbClr r="0" g="0" b="0"/>
-          </a:lnRef>
-          <a:fillRef idx="0">
-            <a:scrgbClr r="0" g="0" b="0"/>
-          </a:fillRef>
-          <a:effectRef idx="0">
-            <a:scrgbClr r="0" g="0" b="0"/>
-          </a:effectRef>
-          <a:fontRef idx="minor">
-            <a:schemeClr val="tx1"/>
-          </a:fontRef>
-        </p:style>
-      </p:cxnSp>
-      <p:cxnSp>
-        <p:nvCxnSpPr>
-          <p:cNvPr id="48" name="Connector: Elbow 47">
-            <a:extLst>
-              <a:ext uri="{FF2B5EF4-FFF2-40B4-BE49-F238E27FC236}">
-                <a16:creationId xmlns:a16="http://schemas.microsoft.com/office/drawing/2014/main" id="{DB90ED21-4527-E68F-5EC2-7F87F5A4FE1A}"/>
-              </a:ext>
-            </a:extLst>
-          </p:cNvPr>
-          <p:cNvCxnSpPr>
-            <a:cxnSpLocks/>
-            <a:endCxn id="11" idx="2"/>
           </p:cNvCxnSpPr>
           <p:nvPr/>
         </p:nvCxnSpPr>
@@ -4839,7 +4055,7 @@
         </p:nvSpPr>
         <p:spPr>
           <a:xfrm>
-            <a:off x="4255960" y="4078389"/>
+            <a:off x="4294990" y="3813601"/>
             <a:ext cx="603050" cy="307777"/>
           </a:xfrm>
           <a:prstGeom prst="rect">
@@ -4863,42 +4079,6 @@
       </p:sp>
       <p:sp>
         <p:nvSpPr>
-          <p:cNvPr id="43" name="TekstSylinder 42">
-            <a:extLst>
-              <a:ext uri="{FF2B5EF4-FFF2-40B4-BE49-F238E27FC236}">
-                <a16:creationId xmlns:a16="http://schemas.microsoft.com/office/drawing/2014/main" id="{4D899DF4-5C8E-E1ED-49AA-6E42EFAF11D3}"/>
-              </a:ext>
-            </a:extLst>
-          </p:cNvPr>
-          <p:cNvSpPr txBox="1"/>
-          <p:nvPr/>
-        </p:nvSpPr>
-        <p:spPr>
-          <a:xfrm>
-            <a:off x="9329057" y="4068279"/>
-            <a:ext cx="712064" cy="307777"/>
-          </a:xfrm>
-          <a:prstGeom prst="rect">
-            <a:avLst/>
-          </a:prstGeom>
-          <a:noFill/>
-        </p:spPr>
-        <p:txBody>
-          <a:bodyPr wrap="square">
-            <a:spAutoFit/>
-          </a:bodyPr>
-          <a:lstStyle/>
-          <a:p>
-            <a:r>
-              <a:rPr lang="nb-NO" sz="1400" dirty="0" err="1"/>
-              <a:t>Urine</a:t>
-            </a:r>
-            <a:endParaRPr lang="nb-NO" sz="1400" dirty="0"/>
-          </a:p>
-        </p:txBody>
-      </p:sp>
-      <p:sp>
-        <p:nvSpPr>
           <p:cNvPr id="2" name="TekstSylinder 1">
             <a:extLst>
               <a:ext uri="{FF2B5EF4-FFF2-40B4-BE49-F238E27FC236}">
@@ -4973,6 +4153,805 @@
           </a:p>
         </p:txBody>
       </p:sp>
+      <p:cxnSp>
+        <p:nvCxnSpPr>
+          <p:cNvPr id="4" name="Connector: Elbow 3">
+            <a:extLst>
+              <a:ext uri="{FF2B5EF4-FFF2-40B4-BE49-F238E27FC236}">
+                <a16:creationId xmlns:a16="http://schemas.microsoft.com/office/drawing/2014/main" id="{8EB2B1CE-8607-B6B7-CB46-3EB1253D5D2F}"/>
+              </a:ext>
+            </a:extLst>
+          </p:cNvPr>
+          <p:cNvCxnSpPr>
+            <a:cxnSpLocks/>
+          </p:cNvCxnSpPr>
+          <p:nvPr/>
+        </p:nvCxnSpPr>
+        <p:spPr>
+          <a:xfrm rot="5400000" flipH="1" flipV="1">
+            <a:off x="3494058" y="2995454"/>
+            <a:ext cx="2592832" cy="980316"/>
+          </a:xfrm>
+          <a:prstGeom prst="bentConnector3">
+            <a:avLst>
+              <a:gd name="adj1" fmla="val 627"/>
+            </a:avLst>
+          </a:prstGeom>
+          <a:ln w="38100" cap="flat" cmpd="sng" algn="ctr">
+            <a:solidFill>
+              <a:schemeClr val="accent1"/>
+            </a:solidFill>
+            <a:prstDash val="solid"/>
+            <a:round/>
+            <a:headEnd type="none" w="med" len="med"/>
+            <a:tailEnd type="arrow" w="med" len="med"/>
+          </a:ln>
+        </p:spPr>
+        <p:style>
+          <a:lnRef idx="0">
+            <a:scrgbClr r="0" g="0" b="0"/>
+          </a:lnRef>
+          <a:fillRef idx="0">
+            <a:scrgbClr r="0" g="0" b="0"/>
+          </a:fillRef>
+          <a:effectRef idx="0">
+            <a:scrgbClr r="0" g="0" b="0"/>
+          </a:effectRef>
+          <a:fontRef idx="minor">
+            <a:schemeClr val="tx1"/>
+          </a:fontRef>
+        </p:style>
+      </p:cxnSp>
+      <p:cxnSp>
+        <p:nvCxnSpPr>
+          <p:cNvPr id="51" name="Straight Connector 50">
+            <a:extLst>
+              <a:ext uri="{FF2B5EF4-FFF2-40B4-BE49-F238E27FC236}">
+                <a16:creationId xmlns:a16="http://schemas.microsoft.com/office/drawing/2014/main" id="{5E313B33-BE35-3290-A434-4C1CAA81D7CE}"/>
+              </a:ext>
+            </a:extLst>
+          </p:cNvPr>
+          <p:cNvCxnSpPr>
+            <a:cxnSpLocks/>
+          </p:cNvCxnSpPr>
+          <p:nvPr/>
+        </p:nvCxnSpPr>
+        <p:spPr>
+          <a:xfrm>
+            <a:off x="4300316" y="3543300"/>
+            <a:ext cx="978408" cy="0"/>
+          </a:xfrm>
+          <a:prstGeom prst="line">
+            <a:avLst/>
+          </a:prstGeom>
+        </p:spPr>
+        <p:style>
+          <a:lnRef idx="3">
+            <a:schemeClr val="accent1"/>
+          </a:lnRef>
+          <a:fillRef idx="0">
+            <a:schemeClr val="accent1"/>
+          </a:fillRef>
+          <a:effectRef idx="2">
+            <a:schemeClr val="accent1"/>
+          </a:effectRef>
+          <a:fontRef idx="minor">
+            <a:schemeClr val="tx1"/>
+          </a:fontRef>
+        </p:style>
+      </p:cxnSp>
+      <p:cxnSp>
+        <p:nvCxnSpPr>
+          <p:cNvPr id="54" name="Straight Connector 53">
+            <a:extLst>
+              <a:ext uri="{FF2B5EF4-FFF2-40B4-BE49-F238E27FC236}">
+                <a16:creationId xmlns:a16="http://schemas.microsoft.com/office/drawing/2014/main" id="{A30225D5-7E86-4871-DE63-B5E9C656B235}"/>
+              </a:ext>
+            </a:extLst>
+          </p:cNvPr>
+          <p:cNvCxnSpPr>
+            <a:cxnSpLocks/>
+          </p:cNvCxnSpPr>
+          <p:nvPr/>
+        </p:nvCxnSpPr>
+        <p:spPr>
+          <a:xfrm>
+            <a:off x="4281716" y="2971800"/>
+            <a:ext cx="982432" cy="563252"/>
+          </a:xfrm>
+          <a:prstGeom prst="line">
+            <a:avLst/>
+          </a:prstGeom>
+        </p:spPr>
+        <p:style>
+          <a:lnRef idx="3">
+            <a:schemeClr val="accent1"/>
+          </a:lnRef>
+          <a:fillRef idx="0">
+            <a:schemeClr val="accent1"/>
+          </a:fillRef>
+          <a:effectRef idx="2">
+            <a:schemeClr val="accent1"/>
+          </a:effectRef>
+          <a:fontRef idx="minor">
+            <a:schemeClr val="tx1"/>
+          </a:fontRef>
+        </p:style>
+      </p:cxnSp>
+      <p:cxnSp>
+        <p:nvCxnSpPr>
+          <p:cNvPr id="59" name="Connector: Elbow 58">
+            <a:extLst>
+              <a:ext uri="{FF2B5EF4-FFF2-40B4-BE49-F238E27FC236}">
+                <a16:creationId xmlns:a16="http://schemas.microsoft.com/office/drawing/2014/main" id="{FEF7BAF9-CCD2-5F36-4840-DF1DD06ED48E}"/>
+              </a:ext>
+            </a:extLst>
+          </p:cNvPr>
+          <p:cNvCxnSpPr>
+            <a:cxnSpLocks/>
+            <a:stCxn id="13" idx="2"/>
+            <a:endCxn id="7" idx="1"/>
+          </p:cNvCxnSpPr>
+          <p:nvPr/>
+        </p:nvCxnSpPr>
+        <p:spPr>
+          <a:xfrm rot="16200000" flipH="1">
+            <a:off x="532664" y="2767410"/>
+            <a:ext cx="2420032" cy="1306171"/>
+          </a:xfrm>
+          <a:prstGeom prst="bentConnector2">
+            <a:avLst/>
+          </a:prstGeom>
+          <a:ln>
+            <a:tailEnd type="triangle"/>
+          </a:ln>
+        </p:spPr>
+        <p:style>
+          <a:lnRef idx="2">
+            <a:schemeClr val="accent1"/>
+          </a:lnRef>
+          <a:fillRef idx="0">
+            <a:schemeClr val="accent1"/>
+          </a:fillRef>
+          <a:effectRef idx="1">
+            <a:schemeClr val="accent1"/>
+          </a:effectRef>
+          <a:fontRef idx="minor">
+            <a:schemeClr val="tx1"/>
+          </a:fontRef>
+        </p:style>
+      </p:cxnSp>
+      <p:sp>
+        <p:nvSpPr>
+          <p:cNvPr id="62" name="Rectangle 61">
+            <a:extLst>
+              <a:ext uri="{FF2B5EF4-FFF2-40B4-BE49-F238E27FC236}">
+                <a16:creationId xmlns:a16="http://schemas.microsoft.com/office/drawing/2014/main" id="{CCD65BF6-1954-5E56-9E77-F9FB6B610D8E}"/>
+              </a:ext>
+            </a:extLst>
+          </p:cNvPr>
+          <p:cNvSpPr/>
+          <p:nvPr/>
+        </p:nvSpPr>
+        <p:spPr>
+          <a:xfrm>
+            <a:off x="7744848" y="2563502"/>
+            <a:ext cx="1885950" cy="628650"/>
+          </a:xfrm>
+          <a:prstGeom prst="rect">
+            <a:avLst/>
+          </a:prstGeom>
+        </p:spPr>
+        <p:style>
+          <a:lnRef idx="2">
+            <a:schemeClr val="accent6"/>
+          </a:lnRef>
+          <a:fillRef idx="1">
+            <a:schemeClr val="lt1"/>
+          </a:fillRef>
+          <a:effectRef idx="0">
+            <a:schemeClr val="accent6"/>
+          </a:effectRef>
+          <a:fontRef idx="minor">
+            <a:schemeClr val="dk1"/>
+          </a:fontRef>
+        </p:style>
+        <p:txBody>
+          <a:bodyPr rtlCol="0" anchor="ctr"/>
+          <a:lstStyle/>
+          <a:p>
+            <a:pPr algn="ctr"/>
+            <a:r>
+              <a:rPr lang="en-US" dirty="0"/>
+              <a:t>Tissue</a:t>
+            </a:r>
+            <a:endParaRPr lang="nb-NO" dirty="0"/>
+          </a:p>
+        </p:txBody>
+      </p:sp>
+      <p:sp>
+        <p:nvSpPr>
+          <p:cNvPr id="63" name="Rectangle 62">
+            <a:extLst>
+              <a:ext uri="{FF2B5EF4-FFF2-40B4-BE49-F238E27FC236}">
+                <a16:creationId xmlns:a16="http://schemas.microsoft.com/office/drawing/2014/main" id="{AE241BC5-2980-B3E4-DA8A-A1F9522A1909}"/>
+              </a:ext>
+            </a:extLst>
+          </p:cNvPr>
+          <p:cNvSpPr/>
+          <p:nvPr/>
+        </p:nvSpPr>
+        <p:spPr>
+          <a:xfrm>
+            <a:off x="7741219" y="3447966"/>
+            <a:ext cx="1885950" cy="628650"/>
+          </a:xfrm>
+          <a:prstGeom prst="rect">
+            <a:avLst/>
+          </a:prstGeom>
+        </p:spPr>
+        <p:style>
+          <a:lnRef idx="2">
+            <a:schemeClr val="accent6"/>
+          </a:lnRef>
+          <a:fillRef idx="1">
+            <a:schemeClr val="lt1"/>
+          </a:fillRef>
+          <a:effectRef idx="0">
+            <a:schemeClr val="accent6"/>
+          </a:effectRef>
+          <a:fontRef idx="minor">
+            <a:schemeClr val="dk1"/>
+          </a:fontRef>
+        </p:style>
+        <p:txBody>
+          <a:bodyPr rtlCol="0" anchor="ctr"/>
+          <a:lstStyle/>
+          <a:p>
+            <a:pPr algn="ctr"/>
+            <a:r>
+              <a:rPr lang="en-US" dirty="0"/>
+              <a:t>Kidney</a:t>
+            </a:r>
+            <a:endParaRPr lang="nb-NO" dirty="0"/>
+          </a:p>
+        </p:txBody>
+      </p:sp>
+      <p:sp>
+        <p:nvSpPr>
+          <p:cNvPr id="64" name="Rectangle 63">
+            <a:extLst>
+              <a:ext uri="{FF2B5EF4-FFF2-40B4-BE49-F238E27FC236}">
+                <a16:creationId xmlns:a16="http://schemas.microsoft.com/office/drawing/2014/main" id="{8BDBD531-D508-F70D-53B2-674258AAEE64}"/>
+              </a:ext>
+            </a:extLst>
+          </p:cNvPr>
+          <p:cNvSpPr/>
+          <p:nvPr/>
+        </p:nvSpPr>
+        <p:spPr>
+          <a:xfrm>
+            <a:off x="7738498" y="4307939"/>
+            <a:ext cx="1885950" cy="628650"/>
+          </a:xfrm>
+          <a:prstGeom prst="rect">
+            <a:avLst/>
+          </a:prstGeom>
+        </p:spPr>
+        <p:style>
+          <a:lnRef idx="2">
+            <a:schemeClr val="accent6"/>
+          </a:lnRef>
+          <a:fillRef idx="1">
+            <a:schemeClr val="lt1"/>
+          </a:fillRef>
+          <a:effectRef idx="0">
+            <a:schemeClr val="accent6"/>
+          </a:effectRef>
+          <a:fontRef idx="minor">
+            <a:schemeClr val="dk1"/>
+          </a:fontRef>
+        </p:style>
+        <p:txBody>
+          <a:bodyPr rtlCol="0" anchor="ctr"/>
+          <a:lstStyle/>
+          <a:p>
+            <a:pPr algn="ctr"/>
+            <a:r>
+              <a:rPr lang="en-US" dirty="0"/>
+              <a:t>Liver</a:t>
+            </a:r>
+            <a:endParaRPr lang="nb-NO" dirty="0"/>
+          </a:p>
+        </p:txBody>
+      </p:sp>
+      <p:sp>
+        <p:nvSpPr>
+          <p:cNvPr id="65" name="Rectangle 64">
+            <a:extLst>
+              <a:ext uri="{FF2B5EF4-FFF2-40B4-BE49-F238E27FC236}">
+                <a16:creationId xmlns:a16="http://schemas.microsoft.com/office/drawing/2014/main" id="{69B84A58-8EAE-261A-0329-5F714569E39D}"/>
+              </a:ext>
+            </a:extLst>
+          </p:cNvPr>
+          <p:cNvSpPr/>
+          <p:nvPr/>
+        </p:nvSpPr>
+        <p:spPr>
+          <a:xfrm>
+            <a:off x="6089427" y="1002082"/>
+            <a:ext cx="685800" cy="1200150"/>
+          </a:xfrm>
+          <a:prstGeom prst="rect">
+            <a:avLst/>
+          </a:prstGeom>
+        </p:spPr>
+        <p:style>
+          <a:lnRef idx="2">
+            <a:schemeClr val="accent6"/>
+          </a:lnRef>
+          <a:fillRef idx="1">
+            <a:schemeClr val="lt1"/>
+          </a:fillRef>
+          <a:effectRef idx="0">
+            <a:schemeClr val="accent6"/>
+          </a:effectRef>
+          <a:fontRef idx="minor">
+            <a:schemeClr val="dk1"/>
+          </a:fontRef>
+        </p:style>
+        <p:txBody>
+          <a:bodyPr rtlCol="0" anchor="ctr"/>
+          <a:lstStyle/>
+          <a:p>
+            <a:pPr algn="ctr"/>
+            <a:r>
+              <a:rPr lang="en-US" sz="1100" b="1" dirty="0"/>
+              <a:t>Arterial Blood</a:t>
+            </a:r>
+            <a:endParaRPr lang="nb-NO" sz="1100" b="1" dirty="0"/>
+          </a:p>
+        </p:txBody>
+      </p:sp>
+      <p:sp>
+        <p:nvSpPr>
+          <p:cNvPr id="66" name="Rectangle 65">
+            <a:extLst>
+              <a:ext uri="{FF2B5EF4-FFF2-40B4-BE49-F238E27FC236}">
+                <a16:creationId xmlns:a16="http://schemas.microsoft.com/office/drawing/2014/main" id="{F5F81F60-4F07-D3CC-6314-741C9E82F24D}"/>
+              </a:ext>
+            </a:extLst>
+          </p:cNvPr>
+          <p:cNvSpPr/>
+          <p:nvPr/>
+        </p:nvSpPr>
+        <p:spPr>
+          <a:xfrm>
+            <a:off x="10263980" y="1002082"/>
+            <a:ext cx="685800" cy="1200149"/>
+          </a:xfrm>
+          <a:prstGeom prst="rect">
+            <a:avLst/>
+          </a:prstGeom>
+        </p:spPr>
+        <p:style>
+          <a:lnRef idx="2">
+            <a:schemeClr val="accent6"/>
+          </a:lnRef>
+          <a:fillRef idx="1">
+            <a:schemeClr val="lt1"/>
+          </a:fillRef>
+          <a:effectRef idx="0">
+            <a:schemeClr val="accent6"/>
+          </a:effectRef>
+          <a:fontRef idx="minor">
+            <a:schemeClr val="dk1"/>
+          </a:fontRef>
+        </p:style>
+        <p:txBody>
+          <a:bodyPr rtlCol="0" anchor="ctr"/>
+          <a:lstStyle/>
+          <a:p>
+            <a:pPr algn="ctr"/>
+            <a:r>
+              <a:rPr lang="en-US" sz="1100" b="1" dirty="0"/>
+              <a:t>Venous Blood</a:t>
+            </a:r>
+            <a:endParaRPr lang="nb-NO" sz="1100" b="1" dirty="0"/>
+          </a:p>
+        </p:txBody>
+      </p:sp>
+      <p:cxnSp>
+        <p:nvCxnSpPr>
+          <p:cNvPr id="67" name="Straight Arrow Connector 66">
+            <a:extLst>
+              <a:ext uri="{FF2B5EF4-FFF2-40B4-BE49-F238E27FC236}">
+                <a16:creationId xmlns:a16="http://schemas.microsoft.com/office/drawing/2014/main" id="{78D5D1B1-8139-47CC-15DA-6976B77B4DA9}"/>
+              </a:ext>
+            </a:extLst>
+          </p:cNvPr>
+          <p:cNvCxnSpPr>
+            <a:cxnSpLocks/>
+          </p:cNvCxnSpPr>
+          <p:nvPr/>
+        </p:nvCxnSpPr>
+        <p:spPr>
+          <a:xfrm flipV="1">
+            <a:off x="6432326" y="2963552"/>
+            <a:ext cx="1306172" cy="1658712"/>
+          </a:xfrm>
+          <a:prstGeom prst="straightConnector1">
+            <a:avLst/>
+          </a:prstGeom>
+          <a:ln w="19050" cap="flat" cmpd="sng" algn="ctr">
+            <a:solidFill>
+              <a:schemeClr val="accent1"/>
+            </a:solidFill>
+            <a:prstDash val="solid"/>
+            <a:round/>
+            <a:headEnd type="none" w="med" len="med"/>
+            <a:tailEnd type="arrow" w="med" len="med"/>
+          </a:ln>
+        </p:spPr>
+        <p:style>
+          <a:lnRef idx="0">
+            <a:scrgbClr r="0" g="0" b="0"/>
+          </a:lnRef>
+          <a:fillRef idx="0">
+            <a:scrgbClr r="0" g="0" b="0"/>
+          </a:fillRef>
+          <a:effectRef idx="0">
+            <a:scrgbClr r="0" g="0" b="0"/>
+          </a:effectRef>
+          <a:fontRef idx="minor">
+            <a:schemeClr val="tx1"/>
+          </a:fontRef>
+        </p:style>
+      </p:cxnSp>
+      <p:cxnSp>
+        <p:nvCxnSpPr>
+          <p:cNvPr id="68" name="Straight Arrow Connector 67">
+            <a:extLst>
+              <a:ext uri="{FF2B5EF4-FFF2-40B4-BE49-F238E27FC236}">
+                <a16:creationId xmlns:a16="http://schemas.microsoft.com/office/drawing/2014/main" id="{D8168357-D047-EA38-DCF4-546915B4308B}"/>
+              </a:ext>
+            </a:extLst>
+          </p:cNvPr>
+          <p:cNvCxnSpPr>
+            <a:cxnSpLocks/>
+          </p:cNvCxnSpPr>
+          <p:nvPr/>
+        </p:nvCxnSpPr>
+        <p:spPr>
+          <a:xfrm flipV="1">
+            <a:off x="6432326" y="3820802"/>
+            <a:ext cx="1312522" cy="821874"/>
+          </a:xfrm>
+          <a:prstGeom prst="straightConnector1">
+            <a:avLst/>
+          </a:prstGeom>
+          <a:ln w="19050" cap="flat" cmpd="sng" algn="ctr">
+            <a:solidFill>
+              <a:schemeClr val="accent1"/>
+            </a:solidFill>
+            <a:prstDash val="solid"/>
+            <a:round/>
+            <a:headEnd type="none" w="med" len="med"/>
+            <a:tailEnd type="arrow" w="med" len="med"/>
+          </a:ln>
+        </p:spPr>
+        <p:style>
+          <a:lnRef idx="0">
+            <a:scrgbClr r="0" g="0" b="0"/>
+          </a:lnRef>
+          <a:fillRef idx="0">
+            <a:scrgbClr r="0" g="0" b="0"/>
+          </a:fillRef>
+          <a:effectRef idx="0">
+            <a:scrgbClr r="0" g="0" b="0"/>
+          </a:effectRef>
+          <a:fontRef idx="minor">
+            <a:schemeClr val="tx1"/>
+          </a:fontRef>
+        </p:style>
+      </p:cxnSp>
+      <p:cxnSp>
+        <p:nvCxnSpPr>
+          <p:cNvPr id="69" name="Straight Arrow Connector 68">
+            <a:extLst>
+              <a:ext uri="{FF2B5EF4-FFF2-40B4-BE49-F238E27FC236}">
+                <a16:creationId xmlns:a16="http://schemas.microsoft.com/office/drawing/2014/main" id="{7FD68642-A17A-84DC-B888-AC94581F01BC}"/>
+              </a:ext>
+            </a:extLst>
+          </p:cNvPr>
+          <p:cNvCxnSpPr>
+            <a:cxnSpLocks/>
+          </p:cNvCxnSpPr>
+          <p:nvPr/>
+        </p:nvCxnSpPr>
+        <p:spPr>
+          <a:xfrm flipH="1">
+            <a:off x="6767396" y="2013773"/>
+            <a:ext cx="3472095" cy="0"/>
+          </a:xfrm>
+          <a:prstGeom prst="straightConnector1">
+            <a:avLst/>
+          </a:prstGeom>
+          <a:ln w="19050" cap="flat" cmpd="sng" algn="ctr">
+            <a:solidFill>
+              <a:schemeClr val="accent1"/>
+            </a:solidFill>
+            <a:prstDash val="solid"/>
+            <a:round/>
+            <a:headEnd type="none" w="med" len="med"/>
+            <a:tailEnd type="arrow" w="med" len="med"/>
+          </a:ln>
+        </p:spPr>
+        <p:style>
+          <a:lnRef idx="0">
+            <a:scrgbClr r="0" g="0" b="0"/>
+          </a:lnRef>
+          <a:fillRef idx="0">
+            <a:scrgbClr r="0" g="0" b="0"/>
+          </a:fillRef>
+          <a:effectRef idx="0">
+            <a:scrgbClr r="0" g="0" b="0"/>
+          </a:effectRef>
+          <a:fontRef idx="minor">
+            <a:schemeClr val="tx1"/>
+          </a:fontRef>
+        </p:style>
+      </p:cxnSp>
+      <p:cxnSp>
+        <p:nvCxnSpPr>
+          <p:cNvPr id="70" name="Straight Arrow Connector 69">
+            <a:extLst>
+              <a:ext uri="{FF2B5EF4-FFF2-40B4-BE49-F238E27FC236}">
+                <a16:creationId xmlns:a16="http://schemas.microsoft.com/office/drawing/2014/main" id="{D773EFF6-D9C7-8ACF-4423-CDECCBF7BE66}"/>
+              </a:ext>
+            </a:extLst>
+          </p:cNvPr>
+          <p:cNvCxnSpPr>
+            <a:cxnSpLocks/>
+          </p:cNvCxnSpPr>
+          <p:nvPr/>
+        </p:nvCxnSpPr>
+        <p:spPr>
+          <a:xfrm>
+            <a:off x="9952832" y="3552107"/>
+            <a:ext cx="0" cy="339634"/>
+          </a:xfrm>
+          <a:prstGeom prst="straightConnector1">
+            <a:avLst/>
+          </a:prstGeom>
+          <a:ln w="19050" cap="flat" cmpd="sng" algn="ctr">
+            <a:solidFill>
+              <a:schemeClr val="accent1"/>
+            </a:solidFill>
+            <a:prstDash val="solid"/>
+            <a:round/>
+            <a:headEnd type="none" w="med" len="med"/>
+            <a:tailEnd type="arrow" w="med" len="med"/>
+          </a:ln>
+        </p:spPr>
+        <p:style>
+          <a:lnRef idx="0">
+            <a:scrgbClr r="0" g="0" b="0"/>
+          </a:lnRef>
+          <a:fillRef idx="0">
+            <a:scrgbClr r="0" g="0" b="0"/>
+          </a:fillRef>
+          <a:effectRef idx="0">
+            <a:scrgbClr r="0" g="0" b="0"/>
+          </a:effectRef>
+          <a:fontRef idx="minor">
+            <a:schemeClr val="tx1"/>
+          </a:fontRef>
+        </p:style>
+      </p:cxnSp>
+      <p:sp>
+        <p:nvSpPr>
+          <p:cNvPr id="71" name="TekstSylinder 39">
+            <a:extLst>
+              <a:ext uri="{FF2B5EF4-FFF2-40B4-BE49-F238E27FC236}">
+                <a16:creationId xmlns:a16="http://schemas.microsoft.com/office/drawing/2014/main" id="{AD8877DB-13B6-4FCE-A581-C6FE62E689E2}"/>
+              </a:ext>
+            </a:extLst>
+          </p:cNvPr>
+          <p:cNvSpPr txBox="1"/>
+          <p:nvPr/>
+        </p:nvSpPr>
+        <p:spPr>
+          <a:xfrm>
+            <a:off x="9637722" y="3805353"/>
+            <a:ext cx="603050" cy="307777"/>
+          </a:xfrm>
+          <a:prstGeom prst="rect">
+            <a:avLst/>
+          </a:prstGeom>
+          <a:noFill/>
+        </p:spPr>
+        <p:txBody>
+          <a:bodyPr wrap="none" rtlCol="0">
+            <a:spAutoFit/>
+          </a:bodyPr>
+          <a:lstStyle/>
+          <a:p>
+            <a:r>
+              <a:rPr lang="nb-NO" sz="1400" dirty="0" err="1"/>
+              <a:t>Urine</a:t>
+            </a:r>
+            <a:endParaRPr lang="nb-NO" sz="1400" dirty="0"/>
+          </a:p>
+        </p:txBody>
+      </p:sp>
+      <p:cxnSp>
+        <p:nvCxnSpPr>
+          <p:cNvPr id="73" name="Connector: Elbow 72">
+            <a:extLst>
+              <a:ext uri="{FF2B5EF4-FFF2-40B4-BE49-F238E27FC236}">
+                <a16:creationId xmlns:a16="http://schemas.microsoft.com/office/drawing/2014/main" id="{155AED8D-2E02-59CD-C862-AF886F29764F}"/>
+              </a:ext>
+            </a:extLst>
+          </p:cNvPr>
+          <p:cNvCxnSpPr>
+            <a:cxnSpLocks/>
+          </p:cNvCxnSpPr>
+          <p:nvPr/>
+        </p:nvCxnSpPr>
+        <p:spPr>
+          <a:xfrm rot="5400000" flipH="1" flipV="1">
+            <a:off x="8836790" y="2987206"/>
+            <a:ext cx="2592832" cy="980316"/>
+          </a:xfrm>
+          <a:prstGeom prst="bentConnector3">
+            <a:avLst>
+              <a:gd name="adj1" fmla="val 627"/>
+            </a:avLst>
+          </a:prstGeom>
+          <a:ln w="38100" cap="flat" cmpd="sng" algn="ctr">
+            <a:solidFill>
+              <a:schemeClr val="accent1"/>
+            </a:solidFill>
+            <a:prstDash val="solid"/>
+            <a:round/>
+            <a:headEnd type="none" w="med" len="med"/>
+            <a:tailEnd type="arrow" w="med" len="med"/>
+          </a:ln>
+        </p:spPr>
+        <p:style>
+          <a:lnRef idx="0">
+            <a:scrgbClr r="0" g="0" b="0"/>
+          </a:lnRef>
+          <a:fillRef idx="0">
+            <a:scrgbClr r="0" g="0" b="0"/>
+          </a:fillRef>
+          <a:effectRef idx="0">
+            <a:scrgbClr r="0" g="0" b="0"/>
+          </a:effectRef>
+          <a:fontRef idx="minor">
+            <a:schemeClr val="tx1"/>
+          </a:fontRef>
+        </p:style>
+      </p:cxnSp>
+      <p:cxnSp>
+        <p:nvCxnSpPr>
+          <p:cNvPr id="74" name="Straight Connector 73">
+            <a:extLst>
+              <a:ext uri="{FF2B5EF4-FFF2-40B4-BE49-F238E27FC236}">
+                <a16:creationId xmlns:a16="http://schemas.microsoft.com/office/drawing/2014/main" id="{B8CACF6D-166E-6374-3674-ACA2A202FF9F}"/>
+              </a:ext>
+            </a:extLst>
+          </p:cNvPr>
+          <p:cNvCxnSpPr>
+            <a:cxnSpLocks/>
+          </p:cNvCxnSpPr>
+          <p:nvPr/>
+        </p:nvCxnSpPr>
+        <p:spPr>
+          <a:xfrm>
+            <a:off x="9643048" y="3535052"/>
+            <a:ext cx="978408" cy="0"/>
+          </a:xfrm>
+          <a:prstGeom prst="line">
+            <a:avLst/>
+          </a:prstGeom>
+        </p:spPr>
+        <p:style>
+          <a:lnRef idx="3">
+            <a:schemeClr val="accent1"/>
+          </a:lnRef>
+          <a:fillRef idx="0">
+            <a:schemeClr val="accent1"/>
+          </a:fillRef>
+          <a:effectRef idx="2">
+            <a:schemeClr val="accent1"/>
+          </a:effectRef>
+          <a:fontRef idx="minor">
+            <a:schemeClr val="tx1"/>
+          </a:fontRef>
+        </p:style>
+      </p:cxnSp>
+      <p:cxnSp>
+        <p:nvCxnSpPr>
+          <p:cNvPr id="75" name="Straight Connector 74">
+            <a:extLst>
+              <a:ext uri="{FF2B5EF4-FFF2-40B4-BE49-F238E27FC236}">
+                <a16:creationId xmlns:a16="http://schemas.microsoft.com/office/drawing/2014/main" id="{BDB7905D-D10A-5A86-A2C1-B2954F8B8193}"/>
+              </a:ext>
+            </a:extLst>
+          </p:cNvPr>
+          <p:cNvCxnSpPr>
+            <a:cxnSpLocks/>
+          </p:cNvCxnSpPr>
+          <p:nvPr/>
+        </p:nvCxnSpPr>
+        <p:spPr>
+          <a:xfrm>
+            <a:off x="9624448" y="2963552"/>
+            <a:ext cx="982432" cy="522060"/>
+          </a:xfrm>
+          <a:prstGeom prst="line">
+            <a:avLst/>
+          </a:prstGeom>
+        </p:spPr>
+        <p:style>
+          <a:lnRef idx="3">
+            <a:schemeClr val="accent1"/>
+          </a:lnRef>
+          <a:fillRef idx="0">
+            <a:schemeClr val="accent1"/>
+          </a:fillRef>
+          <a:effectRef idx="2">
+            <a:schemeClr val="accent1"/>
+          </a:effectRef>
+          <a:fontRef idx="minor">
+            <a:schemeClr val="tx1"/>
+          </a:fontRef>
+        </p:style>
+      </p:cxnSp>
+      <p:cxnSp>
+        <p:nvCxnSpPr>
+          <p:cNvPr id="76" name="Connector: Elbow 75">
+            <a:extLst>
+              <a:ext uri="{FF2B5EF4-FFF2-40B4-BE49-F238E27FC236}">
+                <a16:creationId xmlns:a16="http://schemas.microsoft.com/office/drawing/2014/main" id="{C4217381-D25B-D1F0-ED44-98765146DD6E}"/>
+              </a:ext>
+            </a:extLst>
+          </p:cNvPr>
+          <p:cNvCxnSpPr>
+            <a:stCxn id="65" idx="2"/>
+            <a:endCxn id="64" idx="1"/>
+          </p:cNvCxnSpPr>
+          <p:nvPr/>
+        </p:nvCxnSpPr>
+        <p:spPr>
+          <a:xfrm rot="16200000" flipH="1">
+            <a:off x="5875396" y="2759162"/>
+            <a:ext cx="2420032" cy="1306171"/>
+          </a:xfrm>
+          <a:prstGeom prst="bentConnector2">
+            <a:avLst/>
+          </a:prstGeom>
+          <a:ln>
+            <a:tailEnd type="triangle"/>
+          </a:ln>
+        </p:spPr>
+        <p:style>
+          <a:lnRef idx="2">
+            <a:schemeClr val="accent1"/>
+          </a:lnRef>
+          <a:fillRef idx="0">
+            <a:schemeClr val="accent1"/>
+          </a:fillRef>
+          <a:effectRef idx="1">
+            <a:schemeClr val="accent1"/>
+          </a:effectRef>
+          <a:fontRef idx="minor">
+            <a:schemeClr val="tx1"/>
+          </a:fontRef>
+        </p:style>
+      </p:cxnSp>
     </p:spTree>
     <p:extLst>
       <p:ext uri="{BB962C8B-B14F-4D97-AF65-F5344CB8AC3E}">

</xml_diff>